<commit_message>
Added 'Safety' score to approach
</commit_message>
<xml_diff>
--- a/trunk/submission/MapsterSlides.pptx
+++ b/trunk/submission/MapsterSlides.pptx
@@ -290,7 +290,7 @@
             <a:fld id="{16EA98B6-61B2-41DC-8E89-58EBC6FD50EC}" type="datetimeFigureOut">
               <a:rPr lang="en-US" smtClean="0"/>
               <a:pPr/>
-              <a:t>11/23/2011</a:t>
+              <a:t>11/22/2011</a:t>
             </a:fld>
             <a:endParaRPr lang="en-US"/>
           </a:p>
@@ -457,7 +457,7 @@
             <a:fld id="{16EA98B6-61B2-41DC-8E89-58EBC6FD50EC}" type="datetimeFigureOut">
               <a:rPr lang="en-US" smtClean="0"/>
               <a:pPr/>
-              <a:t>11/23/2011</a:t>
+              <a:t>11/22/2011</a:t>
             </a:fld>
             <a:endParaRPr lang="en-US"/>
           </a:p>
@@ -634,7 +634,7 @@
             <a:fld id="{16EA98B6-61B2-41DC-8E89-58EBC6FD50EC}" type="datetimeFigureOut">
               <a:rPr lang="en-US" smtClean="0"/>
               <a:pPr/>
-              <a:t>11/23/2011</a:t>
+              <a:t>11/22/2011</a:t>
             </a:fld>
             <a:endParaRPr lang="en-US"/>
           </a:p>
@@ -801,7 +801,7 @@
             <a:fld id="{16EA98B6-61B2-41DC-8E89-58EBC6FD50EC}" type="datetimeFigureOut">
               <a:rPr lang="en-US" smtClean="0"/>
               <a:pPr/>
-              <a:t>11/23/2011</a:t>
+              <a:t>11/22/2011</a:t>
             </a:fld>
             <a:endParaRPr lang="en-US"/>
           </a:p>
@@ -1044,7 +1044,7 @@
             <a:fld id="{16EA98B6-61B2-41DC-8E89-58EBC6FD50EC}" type="datetimeFigureOut">
               <a:rPr lang="en-US" smtClean="0"/>
               <a:pPr/>
-              <a:t>11/23/2011</a:t>
+              <a:t>11/22/2011</a:t>
             </a:fld>
             <a:endParaRPr lang="en-US"/>
           </a:p>
@@ -1329,7 +1329,7 @@
             <a:fld id="{16EA98B6-61B2-41DC-8E89-58EBC6FD50EC}" type="datetimeFigureOut">
               <a:rPr lang="en-US" smtClean="0"/>
               <a:pPr/>
-              <a:t>11/23/2011</a:t>
+              <a:t>11/22/2011</a:t>
             </a:fld>
             <a:endParaRPr lang="en-US"/>
           </a:p>
@@ -1748,7 +1748,7 @@
             <a:fld id="{16EA98B6-61B2-41DC-8E89-58EBC6FD50EC}" type="datetimeFigureOut">
               <a:rPr lang="en-US" smtClean="0"/>
               <a:pPr/>
-              <a:t>11/23/2011</a:t>
+              <a:t>11/22/2011</a:t>
             </a:fld>
             <a:endParaRPr lang="en-US"/>
           </a:p>
@@ -1863,7 +1863,7 @@
             <a:fld id="{16EA98B6-61B2-41DC-8E89-58EBC6FD50EC}" type="datetimeFigureOut">
               <a:rPr lang="en-US" smtClean="0"/>
               <a:pPr/>
-              <a:t>11/23/2011</a:t>
+              <a:t>11/22/2011</a:t>
             </a:fld>
             <a:endParaRPr lang="en-US"/>
           </a:p>
@@ -1955,7 +1955,7 @@
             <a:fld id="{16EA98B6-61B2-41DC-8E89-58EBC6FD50EC}" type="datetimeFigureOut">
               <a:rPr lang="en-US" smtClean="0"/>
               <a:pPr/>
-              <a:t>11/23/2011</a:t>
+              <a:t>11/22/2011</a:t>
             </a:fld>
             <a:endParaRPr lang="en-US"/>
           </a:p>
@@ -2229,7 +2229,7 @@
             <a:fld id="{16EA98B6-61B2-41DC-8E89-58EBC6FD50EC}" type="datetimeFigureOut">
               <a:rPr lang="en-US" smtClean="0"/>
               <a:pPr/>
-              <a:t>11/23/2011</a:t>
+              <a:t>11/22/2011</a:t>
             </a:fld>
             <a:endParaRPr lang="en-US"/>
           </a:p>
@@ -2479,7 +2479,7 @@
             <a:fld id="{16EA98B6-61B2-41DC-8E89-58EBC6FD50EC}" type="datetimeFigureOut">
               <a:rPr lang="en-US" smtClean="0"/>
               <a:pPr/>
-              <a:t>11/23/2011</a:t>
+              <a:t>11/22/2011</a:t>
             </a:fld>
             <a:endParaRPr lang="en-US"/>
           </a:p>
@@ -2689,7 +2689,7 @@
             <a:fld id="{16EA98B6-61B2-41DC-8E89-58EBC6FD50EC}" type="datetimeFigureOut">
               <a:rPr lang="en-US" smtClean="0"/>
               <a:pPr/>
-              <a:t>11/23/2011</a:t>
+              <a:t>11/22/2011</a:t>
             </a:fld>
             <a:endParaRPr lang="en-US"/>
           </a:p>
@@ -3153,10 +3153,10 @@
           <p:nvPr/>
         </p:nvPicPr>
         <p:blipFill>
-          <a:blip r:embed="rId3">
+          <a:blip r:embed="rId3" cstate="print">
             <a:extLst>
               <a:ext uri="{28A0092B-C50C-407E-A947-70E740481C1C}">
-                <a14:useLocalDpi xmlns:a14="http://schemas.microsoft.com/office/drawing/2010/main" val="0"/>
+                <a14:useLocalDpi xmlns:a14="http://schemas.microsoft.com/office/drawing/2010/main" xmlns="" val="0"/>
               </a:ext>
             </a:extLst>
           </a:blip>
@@ -3814,7 +3814,7 @@
         </p:blipFill>
         <p:spPr bwMode="auto">
           <a:xfrm>
-            <a:off x="2638696" y="4709831"/>
+            <a:off x="2438400" y="4709831"/>
             <a:ext cx="4066903" cy="2126972"/>
           </a:xfrm>
           <a:prstGeom prst="rect">
@@ -3831,7 +3831,7 @@
       </p:pic>
       <p:sp>
         <p:nvSpPr>
-          <p:cNvPr id="17" name="Title 3"/>
+          <p:cNvPr id="24" name="Title 3"/>
           <p:cNvSpPr txBox="1">
             <a:spLocks/>
           </p:cNvSpPr>
@@ -4005,6 +4005,43 @@
               <a:ea typeface="+mj-ea"/>
               <a:cs typeface="+mj-cs"/>
             </a:endParaRPr>
+          </a:p>
+        </p:txBody>
+      </p:sp>
+      <p:sp>
+        <p:nvSpPr>
+          <p:cNvPr id="26" name="TextBox 25"/>
+          <p:cNvSpPr txBox="1"/>
+          <p:nvPr/>
+        </p:nvSpPr>
+        <p:spPr>
+          <a:xfrm>
+            <a:off x="762000" y="3657600"/>
+            <a:ext cx="1524000" cy="369332"/>
+          </a:xfrm>
+          <a:prstGeom prst="rect">
+            <a:avLst/>
+          </a:prstGeom>
+          <a:noFill/>
+          <a:ln>
+            <a:noFill/>
+          </a:ln>
+        </p:spPr>
+        <p:txBody>
+          <a:bodyPr wrap="square" rtlCol="0">
+            <a:spAutoFit/>
+          </a:bodyPr>
+          <a:lstStyle/>
+          <a:p>
+            <a:r>
+              <a:rPr lang="en-US" dirty="0" smtClean="0"/>
+              <a:t>“</a:t>
+            </a:r>
+            <a:r>
+              <a:rPr lang="en-US" dirty="0" err="1" smtClean="0"/>
+              <a:t>Safety”Score</a:t>
+            </a:r>
+            <a:endParaRPr lang="en-US" dirty="0"/>
           </a:p>
         </p:txBody>
       </p:sp>

</xml_diff>